<commit_message>
praca trwa nad krzywa mocy
</commit_message>
<xml_diff>
--- a/Results 2025 WTG15.pptx
+++ b/Results 2025 WTG15.pptx
@@ -9,6 +9,7 @@
     <p:sldId id="260" r:id="rId3"/>
     <p:sldId id="258" r:id="rId4"/>
     <p:sldId id="259" r:id="rId5"/>
+    <p:sldId id="261" r:id="rId6"/>
   </p:sldIdLst>
   <p:sldSz cx="12192000" cy="6858000"/>
   <p:notesSz cx="6858000" cy="9144000"/>
@@ -3256,7 +3257,7 @@
       </p:grpSpPr>
       <p:pic>
         <p:nvPicPr>
-          <p:cNvPr id="5" name="Picture 4"/>
+          <p:cNvPr id="2" name="Picture 1"/>
           <p:cNvPicPr>
             <a:picLocks noChangeAspect="1"/>
           </p:cNvPicPr>
@@ -3270,8 +3271,8 @@
         </p:blipFill>
         <p:spPr>
           <a:xfrm>
-            <a:off x="5176242" y="0"/>
-            <a:ext cx="6837028" cy="6858000"/>
+            <a:off x="3710300" y="1657350"/>
+            <a:ext cx="8248650" cy="5200650"/>
           </a:xfrm>
           <a:prstGeom prst="rect">
             <a:avLst/>
@@ -3286,8 +3287,8 @@
         </p:nvSpPr>
         <p:spPr>
           <a:xfrm>
-            <a:off x="443621" y="1231271"/>
-            <a:ext cx="4436198" cy="646331"/>
+            <a:off x="7432216" y="494778"/>
+            <a:ext cx="4436198" cy="923330"/>
           </a:xfrm>
           <a:prstGeom prst="rect">
             <a:avLst/>
@@ -3306,7 +3307,11 @@
             </a:pPr>
             <a:r>
               <a:rPr lang="pl-PL" dirty="0" smtClean="0"/>
-              <a:t>Ostania paczka danych, tj od 09 -12 brak danych o wyprodukowanej energii</a:t>
+              <a:t>Ostania paczka danych, tj od 09 -12 brak danych o wyprodukowanej </a:t>
+            </a:r>
+            <a:r>
+              <a:rPr lang="pl-PL" dirty="0" smtClean="0"/>
+              <a:t>energii na WTG15 </a:t>
             </a:r>
             <a:endParaRPr lang="en-GB" dirty="0"/>
           </a:p>
@@ -3320,7 +3325,7 @@
         </p:nvSpPr>
         <p:spPr>
           <a:xfrm>
-            <a:off x="11461008" y="2399168"/>
+            <a:off x="11316152" y="1976802"/>
             <a:ext cx="552262" cy="307817"/>
           </a:xfrm>
           <a:prstGeom prst="ellipse">
@@ -3366,12 +3371,17 @@
         </p:nvCxnSpPr>
         <p:spPr>
           <a:xfrm>
-            <a:off x="4381877" y="1554436"/>
-            <a:ext cx="7079131" cy="844732"/>
+            <a:off x="10746465" y="1141109"/>
+            <a:ext cx="777918" cy="788756"/>
           </a:xfrm>
           <a:prstGeom prst="line">
             <a:avLst/>
           </a:prstGeom>
+          <a:ln>
+            <a:solidFill>
+              <a:srgbClr val="FF0000"/>
+            </a:solidFill>
+          </a:ln>
         </p:spPr>
         <p:style>
           <a:lnRef idx="1">
@@ -3392,6 +3402,74 @@
     <p:extLst>
       <p:ext uri="{BB962C8B-B14F-4D97-AF65-F5344CB8AC3E}">
         <p14:creationId xmlns:p14="http://schemas.microsoft.com/office/powerpoint/2010/main" val="656906479"/>
+      </p:ext>
+    </p:extLst>
+  </p:cSld>
+  <p:clrMapOvr>
+    <a:masterClrMapping/>
+  </p:clrMapOvr>
+</p:sld>
+</file>
+
+<file path=ppt/slides/slide5.xml><?xml version="1.0" encoding="utf-8"?>
+<p:sld xmlns:a="http://schemas.openxmlformats.org/drawingml/2006/main" xmlns:r="http://schemas.openxmlformats.org/officeDocument/2006/relationships" xmlns:p="http://schemas.openxmlformats.org/presentationml/2006/main">
+  <p:cSld>
+    <p:spTree>
+      <p:nvGrpSpPr>
+        <p:cNvPr id="1" name=""/>
+        <p:cNvGrpSpPr/>
+        <p:nvPr/>
+      </p:nvGrpSpPr>
+      <p:grpSpPr>
+        <a:xfrm>
+          <a:off x="0" y="0"/>
+          <a:ext cx="0" cy="0"/>
+          <a:chOff x="0" y="0"/>
+          <a:chExt cx="0" cy="0"/>
+        </a:xfrm>
+      </p:grpSpPr>
+      <p:sp>
+        <p:nvSpPr>
+          <p:cNvPr id="2" name="Title 1"/>
+          <p:cNvSpPr>
+            <a:spLocks noGrp="1"/>
+          </p:cNvSpPr>
+          <p:nvPr>
+            <p:ph type="title"/>
+          </p:nvPr>
+        </p:nvSpPr>
+        <p:spPr/>
+        <p:txBody>
+          <a:bodyPr/>
+          <a:lstStyle/>
+          <a:p>
+            <a:endParaRPr lang="en-GB"/>
+          </a:p>
+        </p:txBody>
+      </p:sp>
+      <p:sp>
+        <p:nvSpPr>
+          <p:cNvPr id="3" name="Content Placeholder 2"/>
+          <p:cNvSpPr>
+            <a:spLocks noGrp="1"/>
+          </p:cNvSpPr>
+          <p:nvPr>
+            <p:ph idx="1"/>
+          </p:nvPr>
+        </p:nvSpPr>
+        <p:spPr/>
+        <p:txBody>
+          <a:bodyPr/>
+          <a:lstStyle/>
+          <a:p>
+            <a:endParaRPr lang="en-GB"/>
+          </a:p>
+        </p:txBody>
+      </p:sp>
+    </p:spTree>
+    <p:extLst>
+      <p:ext uri="{BB962C8B-B14F-4D97-AF65-F5344CB8AC3E}">
+        <p14:creationId xmlns:p14="http://schemas.microsoft.com/office/powerpoint/2010/main" val="3049117929"/>
       </p:ext>
     </p:extLst>
   </p:cSld>

</xml_diff>